<commit_message>
Add changelog vocab to chapter 4 slide
</commit_message>
<xml_diff>
--- a/slides/04 - Chapter 4 - Comments.pptx
+++ b/slides/04 - Chapter 4 - Comments.pptx
@@ -5,7 +5,7 @@
     <p:sldMasterId id="2147483648" r:id="rId1"/>
   </p:sldMasterIdLst>
   <p:notesMasterIdLst>
-    <p:notesMasterId r:id="rId32"/>
+    <p:notesMasterId r:id="rId33"/>
   </p:notesMasterIdLst>
   <p:sldIdLst>
     <p:sldId id="271" r:id="rId2"/>
@@ -37,7 +37,8 @@
     <p:sldId id="311" r:id="rId28"/>
     <p:sldId id="313" r:id="rId29"/>
     <p:sldId id="281" r:id="rId30"/>
-    <p:sldId id="270" r:id="rId31"/>
+    <p:sldId id="317" r:id="rId31"/>
+    <p:sldId id="270" r:id="rId32"/>
   </p:sldIdLst>
   <p:sldSz cx="12192000" cy="6858000"/>
   <p:notesSz cx="12192000" cy="6858000"/>
@@ -237,7 +238,7 @@
           <a:p>
             <a:fld id="{FA3BAC58-2994-4520-AF2C-D43020CE8323}" type="datetimeFigureOut">
               <a:rPr lang="en-US" smtClean="0"/>
-              <a:t>1/6/2021</a:t>
+              <a:t>1/11/2021</a:t>
             </a:fld>
             <a:endParaRPr lang="en-US"/>
           </a:p>
@@ -3117,6 +3118,164 @@
           <a:lstStyle/>
           <a:p>
             <a:pPr marL="0" indent="0" rtl="0" fontAlgn="ctr">
+              <a:buFontTx/>
+              <a:buNone/>
+            </a:pPr>
+            <a:r>
+              <a:rPr lang="en-US" sz="1200" kern="1200" baseline="0" dirty="0" smtClean="0">
+                <a:solidFill>
+                  <a:schemeClr val="tx1"/>
+                </a:solidFill>
+                <a:effectLst/>
+                <a:latin typeface="+mn-lt"/>
+                <a:ea typeface="+mn-ea"/>
+                <a:cs typeface="+mn-cs"/>
+              </a:rPr>
+              <a:t>https://docs.microsoft.com/en-us/dotnet/csharp/whats-new/csharp-9</a:t>
+            </a:r>
+          </a:p>
+          <a:p>
+            <a:pPr marL="0" indent="0" rtl="0" fontAlgn="ctr">
+              <a:buFontTx/>
+              <a:buNone/>
+            </a:pPr>
+            <a:r>
+              <a:rPr lang="en-US" sz="1200" kern="1200" baseline="0" dirty="0" smtClean="0">
+                <a:solidFill>
+                  <a:schemeClr val="tx1"/>
+                </a:solidFill>
+                <a:effectLst/>
+                <a:latin typeface="+mn-lt"/>
+                <a:ea typeface="+mn-ea"/>
+                <a:cs typeface="+mn-cs"/>
+              </a:rPr>
+              <a:t>https://github.com/material-components/material-components-android/releases</a:t>
+            </a:r>
+          </a:p>
+          <a:p>
+            <a:pPr marL="0" indent="0" rtl="0" fontAlgn="ctr">
+              <a:buFontTx/>
+              <a:buNone/>
+            </a:pPr>
+            <a:r>
+              <a:rPr lang="en-US" sz="1200" kern="1200" baseline="0" dirty="0" smtClean="0">
+                <a:solidFill>
+                  <a:schemeClr val="tx1"/>
+                </a:solidFill>
+                <a:effectLst/>
+                <a:latin typeface="+mn-lt"/>
+                <a:ea typeface="+mn-ea"/>
+                <a:cs typeface="+mn-cs"/>
+              </a:rPr>
+              <a:t>https://github.com/google/dagger/releases</a:t>
+            </a:r>
+            <a:endParaRPr lang="en-US" sz="1200" kern="1200" baseline="0" dirty="0" smtClean="0">
+              <a:solidFill>
+                <a:schemeClr val="tx1"/>
+              </a:solidFill>
+              <a:effectLst/>
+              <a:latin typeface="+mn-lt"/>
+              <a:ea typeface="+mn-ea"/>
+              <a:cs typeface="+mn-cs"/>
+            </a:endParaRPr>
+          </a:p>
+          <a:p>
+            <a:pPr marL="0" indent="0" rtl="0" fontAlgn="ctr">
+              <a:buNone/>
+            </a:pPr>
+            <a:endParaRPr lang="x-none" sz="1200" kern="1200" dirty="0" smtClean="0">
+              <a:solidFill>
+                <a:schemeClr val="tx1"/>
+              </a:solidFill>
+              <a:effectLst/>
+              <a:latin typeface="+mn-lt"/>
+              <a:ea typeface="+mn-ea"/>
+              <a:cs typeface="+mn-cs"/>
+            </a:endParaRPr>
+          </a:p>
+        </p:txBody>
+      </p:sp>
+      <p:sp>
+        <p:nvSpPr>
+          <p:cNvPr id="4" name="Slide Number Placeholder 3"/>
+          <p:cNvSpPr>
+            <a:spLocks noGrp="1"/>
+          </p:cNvSpPr>
+          <p:nvPr>
+            <p:ph type="sldNum" sz="quarter" idx="10"/>
+          </p:nvPr>
+        </p:nvSpPr>
+        <p:spPr/>
+        <p:txBody>
+          <a:bodyPr/>
+          <a:lstStyle/>
+          <a:p>
+            <a:fld id="{38627BB8-F6A4-4A78-9DDC-C4121304CC62}" type="slidenum">
+              <a:rPr lang="en-US" smtClean="0"/>
+              <a:t>29</a:t>
+            </a:fld>
+            <a:endParaRPr lang="en-US"/>
+          </a:p>
+        </p:txBody>
+      </p:sp>
+    </p:spTree>
+    <p:extLst>
+      <p:ext uri="{BB962C8B-B14F-4D97-AF65-F5344CB8AC3E}">
+        <p14:creationId xmlns:p14="http://schemas.microsoft.com/office/powerpoint/2010/main" val="876304035"/>
+      </p:ext>
+    </p:extLst>
+  </p:cSld>
+  <p:clrMapOvr>
+    <a:masterClrMapping/>
+  </p:clrMapOvr>
+</p:notes>
+</file>
+
+<file path=ppt/notesSlides/notesSlide29.xml><?xml version="1.0" encoding="utf-8"?>
+<p:notes xmlns:a="http://schemas.openxmlformats.org/drawingml/2006/main" xmlns:r="http://schemas.openxmlformats.org/officeDocument/2006/relationships" xmlns:p="http://schemas.openxmlformats.org/presentationml/2006/main">
+  <p:cSld>
+    <p:spTree>
+      <p:nvGrpSpPr>
+        <p:cNvPr id="1" name=""/>
+        <p:cNvGrpSpPr/>
+        <p:nvPr/>
+      </p:nvGrpSpPr>
+      <p:grpSpPr>
+        <a:xfrm>
+          <a:off x="0" y="0"/>
+          <a:ext cx="0" cy="0"/>
+          <a:chOff x="0" y="0"/>
+          <a:chExt cx="0" cy="0"/>
+        </a:xfrm>
+      </p:grpSpPr>
+      <p:sp>
+        <p:nvSpPr>
+          <p:cNvPr id="2" name="Slide Image Placeholder 1"/>
+          <p:cNvSpPr>
+            <a:spLocks noGrp="1" noRot="1" noChangeAspect="1"/>
+          </p:cNvSpPr>
+          <p:nvPr>
+            <p:ph type="sldImg"/>
+          </p:nvPr>
+        </p:nvSpPr>
+        <p:spPr/>
+      </p:sp>
+      <p:sp>
+        <p:nvSpPr>
+          <p:cNvPr id="3" name="Notes Placeholder 2"/>
+          <p:cNvSpPr>
+            <a:spLocks noGrp="1"/>
+          </p:cNvSpPr>
+          <p:nvPr>
+            <p:ph type="body" idx="1"/>
+          </p:nvPr>
+        </p:nvSpPr>
+        <p:spPr/>
+        <p:txBody>
+          <a:bodyPr/>
+          <a:lstStyle/>
+          <a:p>
+            <a:pPr marL="0" indent="0" rtl="0" fontAlgn="ctr">
               <a:buNone/>
             </a:pPr>
             <a:r>
@@ -3228,7 +3387,7 @@
           <a:p>
             <a:fld id="{38627BB8-F6A4-4A78-9DDC-C4121304CC62}" type="slidenum">
               <a:rPr lang="en-US" smtClean="0"/>
-              <a:t>29</a:t>
+              <a:t>30</a:t>
             </a:fld>
             <a:endParaRPr lang="en-US"/>
           </a:p>
@@ -3237,7 +3396,7 @@
     </p:spTree>
     <p:extLst>
       <p:ext uri="{BB962C8B-B14F-4D97-AF65-F5344CB8AC3E}">
-        <p14:creationId xmlns:p14="http://schemas.microsoft.com/office/powerpoint/2010/main" val="876304035"/>
+        <p14:creationId xmlns:p14="http://schemas.microsoft.com/office/powerpoint/2010/main" val="3162544237"/>
       </p:ext>
     </p:extLst>
   </p:cSld>
@@ -4099,7 +4258,7 @@
           <a:p>
             <a:fld id="{1D8BD707-D9CF-40AE-B4C6-C98DA3205C09}" type="datetimeFigureOut">
               <a:rPr lang="en-US"/>
-              <a:t>1/6/2021</a:t>
+              <a:t>1/11/2021</a:t>
             </a:fld>
             <a:endParaRPr lang="en-US"/>
           </a:p>
@@ -4274,7 +4433,7 @@
           <a:p>
             <a:fld id="{1D8BD707-D9CF-40AE-B4C6-C98DA3205C09}" type="datetimeFigureOut">
               <a:rPr lang="en-US"/>
-              <a:t>1/6/2021</a:t>
+              <a:t>1/11/2021</a:t>
             </a:fld>
             <a:endParaRPr lang="en-US"/>
           </a:p>
@@ -4488,7 +4647,7 @@
           <a:p>
             <a:fld id="{1D8BD707-D9CF-40AE-B4C6-C98DA3205C09}" type="datetimeFigureOut">
               <a:rPr lang="en-US"/>
-              <a:t>1/6/2021</a:t>
+              <a:t>1/11/2021</a:t>
             </a:fld>
             <a:endParaRPr lang="en-US"/>
           </a:p>
@@ -4636,7 +4795,7 @@
           <a:p>
             <a:fld id="{1D8BD707-D9CF-40AE-B4C6-C98DA3205C09}" type="datetimeFigureOut">
               <a:rPr lang="en-US"/>
-              <a:t>1/6/2021</a:t>
+              <a:t>1/11/2021</a:t>
             </a:fld>
             <a:endParaRPr lang="en-US"/>
           </a:p>
@@ -4755,7 +4914,7 @@
           <a:p>
             <a:fld id="{1D8BD707-D9CF-40AE-B4C6-C98DA3205C09}" type="datetimeFigureOut">
               <a:rPr lang="en-US"/>
-              <a:t>1/6/2021</a:t>
+              <a:t>1/11/2021</a:t>
             </a:fld>
             <a:endParaRPr lang="en-US"/>
           </a:p>
@@ -5057,7 +5216,7 @@
           <a:p>
             <a:fld id="{1D8BD707-D9CF-40AE-B4C6-C98DA3205C09}" type="datetimeFigureOut">
               <a:rPr lang="en-US"/>
-              <a:t>1/6/2021</a:t>
+              <a:t>1/11/2021</a:t>
             </a:fld>
             <a:endParaRPr lang="en-US"/>
           </a:p>
@@ -8730,6 +8889,423 @@
         </p:nvSpPr>
         <p:spPr>
           <a:xfrm>
+            <a:off x="-381000" y="1143000"/>
+            <a:ext cx="12341605" cy="615553"/>
+          </a:xfrm>
+          <a:prstGeom prst="rect">
+            <a:avLst/>
+          </a:prstGeom>
+        </p:spPr>
+        <p:txBody>
+          <a:bodyPr vert="horz" wrap="square" lIns="0" tIns="0" rIns="0" bIns="0" rtlCol="0">
+            <a:spAutoFit/>
+          </a:bodyPr>
+          <a:lstStyle/>
+          <a:p>
+            <a:pPr marL="6086475" rtl="0">
+              <a:lnSpc>
+                <a:spcPct val="100000"/>
+              </a:lnSpc>
+            </a:pPr>
+            <a:r>
+              <a:rPr lang="en-US" spc="-5" dirty="0" smtClean="0">
+                <a:solidFill>
+                  <a:srgbClr val="00B0F0"/>
+                </a:solidFill>
+              </a:rPr>
+              <a:t>Vocabulary</a:t>
+            </a:r>
+            <a:r>
+              <a:rPr lang="en-US" spc="-5" dirty="0" smtClean="0"/>
+              <a:t>: Changelog</a:t>
+            </a:r>
+            <a:endParaRPr spc="-5" dirty="0">
+              <a:latin typeface="Century Gothic"/>
+              <a:cs typeface="Century Gothic"/>
+            </a:endParaRPr>
+          </a:p>
+        </p:txBody>
+      </p:sp>
+      <p:sp>
+        <p:nvSpPr>
+          <p:cNvPr id="3" name="object 3"/>
+          <p:cNvSpPr txBox="1"/>
+          <p:nvPr/>
+        </p:nvSpPr>
+        <p:spPr>
+          <a:xfrm>
+            <a:off x="892986" y="2133600"/>
+            <a:ext cx="10765614" cy="984885"/>
+          </a:xfrm>
+          <a:prstGeom prst="rect">
+            <a:avLst/>
+          </a:prstGeom>
+        </p:spPr>
+        <p:txBody>
+          <a:bodyPr vert="horz" wrap="square" lIns="0" tIns="0" rIns="0" bIns="0" rtlCol="0">
+            <a:spAutoFit/>
+          </a:bodyPr>
+          <a:lstStyle/>
+          <a:p>
+            <a:pPr marL="12700" algn="ctr">
+              <a:lnSpc>
+                <a:spcPct val="100000"/>
+              </a:lnSpc>
+              <a:tabLst>
+                <a:tab pos="241300" algn="l"/>
+              </a:tabLst>
+            </a:pPr>
+            <a:r>
+              <a:rPr lang="en-US" sz="3200" dirty="0">
+                <a:solidFill>
+                  <a:srgbClr val="FFFFFF"/>
+                </a:solidFill>
+                <a:latin typeface="Century Gothic"/>
+                <a:cs typeface="Century Gothic"/>
+              </a:rPr>
+              <a:t>A changelog is a </a:t>
+            </a:r>
+            <a:r>
+              <a:rPr lang="en-US" sz="3200" dirty="0">
+                <a:solidFill>
+                  <a:srgbClr val="FFFF00"/>
+                </a:solidFill>
+                <a:latin typeface="Century Gothic"/>
+                <a:cs typeface="Century Gothic"/>
+              </a:rPr>
+              <a:t>log</a:t>
+            </a:r>
+            <a:r>
+              <a:rPr lang="en-US" sz="3200" dirty="0">
+                <a:solidFill>
+                  <a:srgbClr val="FFFFFF"/>
+                </a:solidFill>
+                <a:latin typeface="Century Gothic"/>
+                <a:cs typeface="Century Gothic"/>
+              </a:rPr>
+              <a:t> or record of all notable changes made to a project.</a:t>
+            </a:r>
+            <a:endParaRPr lang="en-US" sz="3200" dirty="0" smtClean="0">
+              <a:solidFill>
+                <a:schemeClr val="bg1"/>
+              </a:solidFill>
+              <a:latin typeface="Century Gothic"/>
+              <a:cs typeface="Century Gothic"/>
+            </a:endParaRPr>
+          </a:p>
+        </p:txBody>
+      </p:sp>
+      <p:sp>
+        <p:nvSpPr>
+          <p:cNvPr id="4" name="TextBox 3"/>
+          <p:cNvSpPr txBox="1"/>
+          <p:nvPr/>
+        </p:nvSpPr>
+        <p:spPr>
+          <a:xfrm>
+            <a:off x="4348599" y="5105400"/>
+            <a:ext cx="3854388" cy="369332"/>
+          </a:xfrm>
+          <a:prstGeom prst="rect">
+            <a:avLst/>
+          </a:prstGeom>
+          <a:noFill/>
+        </p:spPr>
+        <p:txBody>
+          <a:bodyPr wrap="none" rtlCol="0">
+            <a:spAutoFit/>
+          </a:bodyPr>
+          <a:lstStyle/>
+          <a:p>
+            <a:r>
+              <a:rPr lang="en-US" dirty="0">
+                <a:solidFill>
+                  <a:schemeClr val="bg1"/>
+                </a:solidFill>
+                <a:hlinkClick r:id="rId3"/>
+              </a:rPr>
+              <a:t>https://keepachangelog.com/en/1.1.0/</a:t>
+            </a:r>
+            <a:endParaRPr lang="en-US" dirty="0">
+              <a:solidFill>
+                <a:schemeClr val="bg1"/>
+              </a:solidFill>
+            </a:endParaRPr>
+          </a:p>
+        </p:txBody>
+      </p:sp>
+      <p:sp>
+        <p:nvSpPr>
+          <p:cNvPr id="5" name="TextBox 4"/>
+          <p:cNvSpPr txBox="1"/>
+          <p:nvPr/>
+        </p:nvSpPr>
+        <p:spPr>
+          <a:xfrm>
+            <a:off x="5262503" y="5791200"/>
+            <a:ext cx="2026580" cy="369332"/>
+          </a:xfrm>
+          <a:prstGeom prst="rect">
+            <a:avLst/>
+          </a:prstGeom>
+          <a:noFill/>
+        </p:spPr>
+        <p:txBody>
+          <a:bodyPr wrap="none" rtlCol="0">
+            <a:spAutoFit/>
+          </a:bodyPr>
+          <a:lstStyle/>
+          <a:p>
+            <a:r>
+              <a:rPr lang="en-US" dirty="0">
+                <a:solidFill>
+                  <a:schemeClr val="bg1"/>
+                </a:solidFill>
+                <a:hlinkClick r:id="rId4"/>
+              </a:rPr>
+              <a:t>https://semver.org/</a:t>
+            </a:r>
+            <a:endParaRPr lang="en-US" dirty="0">
+              <a:solidFill>
+                <a:schemeClr val="bg1"/>
+              </a:solidFill>
+            </a:endParaRPr>
+          </a:p>
+        </p:txBody>
+      </p:sp>
+    </p:spTree>
+    <p:extLst>
+      <p:ext uri="{BB962C8B-B14F-4D97-AF65-F5344CB8AC3E}">
+        <p14:creationId xmlns:p14="http://schemas.microsoft.com/office/powerpoint/2010/main" val="2325322287"/>
+      </p:ext>
+    </p:extLst>
+  </p:cSld>
+  <p:clrMapOvr>
+    <a:masterClrMapping/>
+  </p:clrMapOvr>
+  <p:timing>
+    <p:tnLst>
+      <p:par>
+        <p:cTn id="1" dur="indefinite" restart="never" nodeType="tmRoot"/>
+      </p:par>
+    </p:tnLst>
+  </p:timing>
+</p:sld>
+</file>
+
+<file path=ppt/slides/slide3.xml><?xml version="1.0" encoding="utf-8"?>
+<p:sld xmlns:a="http://schemas.openxmlformats.org/drawingml/2006/main" xmlns:r="http://schemas.openxmlformats.org/officeDocument/2006/relationships" xmlns:p="http://schemas.openxmlformats.org/presentationml/2006/main">
+  <p:cSld>
+    <p:spTree>
+      <p:nvGrpSpPr>
+        <p:cNvPr id="1" name=""/>
+        <p:cNvGrpSpPr/>
+        <p:nvPr/>
+      </p:nvGrpSpPr>
+      <p:grpSpPr>
+        <a:xfrm>
+          <a:off x="0" y="0"/>
+          <a:ext cx="0" cy="0"/>
+          <a:chOff x="0" y="0"/>
+          <a:chExt cx="0" cy="0"/>
+        </a:xfrm>
+      </p:grpSpPr>
+      <p:sp>
+        <p:nvSpPr>
+          <p:cNvPr id="2" name="object 2"/>
+          <p:cNvSpPr txBox="1">
+            <a:spLocks noGrp="1"/>
+          </p:cNvSpPr>
+          <p:nvPr>
+            <p:ph type="title"/>
+          </p:nvPr>
+        </p:nvSpPr>
+        <p:spPr>
+          <a:xfrm>
+            <a:off x="-762000" y="1143476"/>
+            <a:ext cx="12496800" cy="1231106"/>
+          </a:xfrm>
+          <a:prstGeom prst="rect">
+            <a:avLst/>
+          </a:prstGeom>
+        </p:spPr>
+        <p:txBody>
+          <a:bodyPr vert="horz" wrap="square" lIns="0" tIns="0" rIns="0" bIns="0" rtlCol="0">
+            <a:spAutoFit/>
+          </a:bodyPr>
+          <a:lstStyle/>
+          <a:p>
+            <a:pPr marL="6086475" algn="ctr">
+              <a:lnSpc>
+                <a:spcPct val="100000"/>
+              </a:lnSpc>
+            </a:pPr>
+            <a:r>
+              <a:rPr lang="en-US" dirty="0"/>
+              <a:t>Comments Do Not Make Up for Bad Code</a:t>
+            </a:r>
+            <a:endParaRPr spc="-5" dirty="0">
+              <a:latin typeface="Century Gothic"/>
+              <a:cs typeface="Century Gothic"/>
+            </a:endParaRPr>
+          </a:p>
+        </p:txBody>
+      </p:sp>
+      <p:sp>
+        <p:nvSpPr>
+          <p:cNvPr id="4" name="object 3"/>
+          <p:cNvSpPr txBox="1"/>
+          <p:nvPr/>
+        </p:nvSpPr>
+        <p:spPr>
+          <a:xfrm>
+            <a:off x="1200581" y="3657600"/>
+            <a:ext cx="10534219" cy="492443"/>
+          </a:xfrm>
+          <a:prstGeom prst="rect">
+            <a:avLst/>
+          </a:prstGeom>
+        </p:spPr>
+        <p:txBody>
+          <a:bodyPr vert="horz" wrap="square" lIns="0" tIns="0" rIns="0" bIns="0" rtlCol="0">
+            <a:spAutoFit/>
+          </a:bodyPr>
+          <a:lstStyle/>
+          <a:p>
+            <a:pPr marL="12700">
+              <a:lnSpc>
+                <a:spcPct val="100000"/>
+              </a:lnSpc>
+              <a:tabLst>
+                <a:tab pos="241300" algn="l"/>
+              </a:tabLst>
+            </a:pPr>
+            <a:r>
+              <a:rPr lang="en-US" sz="3200" dirty="0">
+                <a:solidFill>
+                  <a:srgbClr val="FFFF00"/>
+                </a:solidFill>
+                <a:latin typeface="Century Gothic"/>
+                <a:cs typeface="Century Gothic"/>
+              </a:rPr>
+              <a:t>Don’t comment bad </a:t>
+            </a:r>
+            <a:r>
+              <a:rPr lang="en-US" sz="3200" dirty="0" smtClean="0">
+                <a:solidFill>
+                  <a:srgbClr val="FFFF00"/>
+                </a:solidFill>
+                <a:latin typeface="Century Gothic"/>
+                <a:cs typeface="Century Gothic"/>
+              </a:rPr>
+              <a:t>code—rewrite </a:t>
+            </a:r>
+            <a:r>
+              <a:rPr lang="en-US" sz="3200" dirty="0">
+                <a:solidFill>
+                  <a:srgbClr val="FFFF00"/>
+                </a:solidFill>
+                <a:latin typeface="Century Gothic"/>
+                <a:cs typeface="Century Gothic"/>
+              </a:rPr>
+              <a:t>it</a:t>
+            </a:r>
+            <a:endParaRPr sz="3200" dirty="0">
+              <a:solidFill>
+                <a:srgbClr val="FFFF00"/>
+              </a:solidFill>
+              <a:latin typeface="Century Gothic"/>
+              <a:cs typeface="Century Gothic"/>
+            </a:endParaRPr>
+          </a:p>
+        </p:txBody>
+      </p:sp>
+      <p:sp>
+        <p:nvSpPr>
+          <p:cNvPr id="5" name="Rectangle 4"/>
+          <p:cNvSpPr/>
+          <p:nvPr/>
+        </p:nvSpPr>
+        <p:spPr>
+          <a:xfrm>
+            <a:off x="8915400" y="5101183"/>
+            <a:ext cx="1958741" cy="369332"/>
+          </a:xfrm>
+          <a:prstGeom prst="rect">
+            <a:avLst/>
+          </a:prstGeom>
+        </p:spPr>
+        <p:txBody>
+          <a:bodyPr wrap="none">
+            <a:spAutoFit/>
+          </a:bodyPr>
+          <a:lstStyle/>
+          <a:p>
+            <a:r>
+              <a:rPr lang="en-US" spc="-5" dirty="0">
+                <a:solidFill>
+                  <a:srgbClr val="00B0F0"/>
+                </a:solidFill>
+              </a:rPr>
+              <a:t>Brian W. Kernighan</a:t>
+            </a:r>
+            <a:endParaRPr lang="en-US" dirty="0">
+              <a:solidFill>
+                <a:srgbClr val="00B0F0"/>
+              </a:solidFill>
+            </a:endParaRPr>
+          </a:p>
+        </p:txBody>
+      </p:sp>
+    </p:spTree>
+    <p:extLst>
+      <p:ext uri="{BB962C8B-B14F-4D97-AF65-F5344CB8AC3E}">
+        <p14:creationId xmlns:p14="http://schemas.microsoft.com/office/powerpoint/2010/main" val="2124089348"/>
+      </p:ext>
+    </p:extLst>
+  </p:cSld>
+  <p:clrMapOvr>
+    <a:masterClrMapping/>
+  </p:clrMapOvr>
+  <p:timing>
+    <p:tnLst>
+      <p:par>
+        <p:cTn id="1" dur="indefinite" restart="never" nodeType="tmRoot"/>
+      </p:par>
+    </p:tnLst>
+  </p:timing>
+</p:sld>
+</file>
+
+<file path=ppt/slides/slide30.xml><?xml version="1.0" encoding="utf-8"?>
+<p:sld xmlns:a="http://schemas.openxmlformats.org/drawingml/2006/main" xmlns:r="http://schemas.openxmlformats.org/officeDocument/2006/relationships" xmlns:p="http://schemas.openxmlformats.org/presentationml/2006/main">
+  <p:cSld>
+    <p:spTree>
+      <p:nvGrpSpPr>
+        <p:cNvPr id="1" name=""/>
+        <p:cNvGrpSpPr/>
+        <p:nvPr/>
+      </p:nvGrpSpPr>
+      <p:grpSpPr>
+        <a:xfrm>
+          <a:off x="0" y="0"/>
+          <a:ext cx="0" cy="0"/>
+          <a:chOff x="0" y="0"/>
+          <a:chExt cx="0" cy="0"/>
+        </a:xfrm>
+      </p:grpSpPr>
+      <p:sp>
+        <p:nvSpPr>
+          <p:cNvPr id="2" name="object 2"/>
+          <p:cNvSpPr txBox="1">
+            <a:spLocks noGrp="1"/>
+          </p:cNvSpPr>
+          <p:nvPr>
+            <p:ph type="title"/>
+          </p:nvPr>
+        </p:nvSpPr>
+        <p:spPr>
+          <a:xfrm>
             <a:off x="-1066800" y="1143000"/>
             <a:ext cx="13027405" cy="615553"/>
           </a:xfrm>
@@ -8994,7 +9570,7 @@
     </p:spTree>
     <p:extLst>
       <p:ext uri="{BB962C8B-B14F-4D97-AF65-F5344CB8AC3E}">
-        <p14:creationId xmlns:p14="http://schemas.microsoft.com/office/powerpoint/2010/main" val="2325322287"/>
+        <p14:creationId xmlns:p14="http://schemas.microsoft.com/office/powerpoint/2010/main" val="3821158735"/>
       </p:ext>
     </p:extLst>
   </p:cSld>
@@ -9011,191 +9587,7 @@
 </p:sld>
 </file>
 
-<file path=ppt/slides/slide3.xml><?xml version="1.0" encoding="utf-8"?>
-<p:sld xmlns:a="http://schemas.openxmlformats.org/drawingml/2006/main" xmlns:r="http://schemas.openxmlformats.org/officeDocument/2006/relationships" xmlns:p="http://schemas.openxmlformats.org/presentationml/2006/main">
-  <p:cSld>
-    <p:spTree>
-      <p:nvGrpSpPr>
-        <p:cNvPr id="1" name=""/>
-        <p:cNvGrpSpPr/>
-        <p:nvPr/>
-      </p:nvGrpSpPr>
-      <p:grpSpPr>
-        <a:xfrm>
-          <a:off x="0" y="0"/>
-          <a:ext cx="0" cy="0"/>
-          <a:chOff x="0" y="0"/>
-          <a:chExt cx="0" cy="0"/>
-        </a:xfrm>
-      </p:grpSpPr>
-      <p:sp>
-        <p:nvSpPr>
-          <p:cNvPr id="2" name="object 2"/>
-          <p:cNvSpPr txBox="1">
-            <a:spLocks noGrp="1"/>
-          </p:cNvSpPr>
-          <p:nvPr>
-            <p:ph type="title"/>
-          </p:nvPr>
-        </p:nvSpPr>
-        <p:spPr>
-          <a:xfrm>
-            <a:off x="-762000" y="1143476"/>
-            <a:ext cx="12496800" cy="1231106"/>
-          </a:xfrm>
-          <a:prstGeom prst="rect">
-            <a:avLst/>
-          </a:prstGeom>
-        </p:spPr>
-        <p:txBody>
-          <a:bodyPr vert="horz" wrap="square" lIns="0" tIns="0" rIns="0" bIns="0" rtlCol="0">
-            <a:spAutoFit/>
-          </a:bodyPr>
-          <a:lstStyle/>
-          <a:p>
-            <a:pPr marL="6086475" algn="ctr">
-              <a:lnSpc>
-                <a:spcPct val="100000"/>
-              </a:lnSpc>
-            </a:pPr>
-            <a:r>
-              <a:rPr lang="en-US" dirty="0"/>
-              <a:t>Comments Do Not Make Up for Bad Code</a:t>
-            </a:r>
-            <a:endParaRPr spc="-5" dirty="0">
-              <a:latin typeface="Century Gothic"/>
-              <a:cs typeface="Century Gothic"/>
-            </a:endParaRPr>
-          </a:p>
-        </p:txBody>
-      </p:sp>
-      <p:sp>
-        <p:nvSpPr>
-          <p:cNvPr id="4" name="object 3"/>
-          <p:cNvSpPr txBox="1"/>
-          <p:nvPr/>
-        </p:nvSpPr>
-        <p:spPr>
-          <a:xfrm>
-            <a:off x="1200581" y="3657600"/>
-            <a:ext cx="10534219" cy="492443"/>
-          </a:xfrm>
-          <a:prstGeom prst="rect">
-            <a:avLst/>
-          </a:prstGeom>
-        </p:spPr>
-        <p:txBody>
-          <a:bodyPr vert="horz" wrap="square" lIns="0" tIns="0" rIns="0" bIns="0" rtlCol="0">
-            <a:spAutoFit/>
-          </a:bodyPr>
-          <a:lstStyle/>
-          <a:p>
-            <a:pPr marL="12700">
-              <a:lnSpc>
-                <a:spcPct val="100000"/>
-              </a:lnSpc>
-              <a:tabLst>
-                <a:tab pos="241300" algn="l"/>
-              </a:tabLst>
-            </a:pPr>
-            <a:r>
-              <a:rPr lang="en-US" sz="3200" dirty="0">
-                <a:solidFill>
-                  <a:srgbClr val="FFFF00"/>
-                </a:solidFill>
-                <a:latin typeface="Century Gothic"/>
-                <a:cs typeface="Century Gothic"/>
-              </a:rPr>
-              <a:t>Don’t comment bad </a:t>
-            </a:r>
-            <a:r>
-              <a:rPr lang="en-US" sz="3200" dirty="0" smtClean="0">
-                <a:solidFill>
-                  <a:srgbClr val="FFFF00"/>
-                </a:solidFill>
-                <a:latin typeface="Century Gothic"/>
-                <a:cs typeface="Century Gothic"/>
-              </a:rPr>
-              <a:t>code—rewrite </a:t>
-            </a:r>
-            <a:r>
-              <a:rPr lang="en-US" sz="3200" dirty="0">
-                <a:solidFill>
-                  <a:srgbClr val="FFFF00"/>
-                </a:solidFill>
-                <a:latin typeface="Century Gothic"/>
-                <a:cs typeface="Century Gothic"/>
-              </a:rPr>
-              <a:t>it</a:t>
-            </a:r>
-            <a:endParaRPr sz="3200" dirty="0">
-              <a:solidFill>
-                <a:srgbClr val="FFFF00"/>
-              </a:solidFill>
-              <a:latin typeface="Century Gothic"/>
-              <a:cs typeface="Century Gothic"/>
-            </a:endParaRPr>
-          </a:p>
-        </p:txBody>
-      </p:sp>
-      <p:sp>
-        <p:nvSpPr>
-          <p:cNvPr id="5" name="Rectangle 4"/>
-          <p:cNvSpPr/>
-          <p:nvPr/>
-        </p:nvSpPr>
-        <p:spPr>
-          <a:xfrm>
-            <a:off x="8915400" y="5101183"/>
-            <a:ext cx="1958741" cy="369332"/>
-          </a:xfrm>
-          <a:prstGeom prst="rect">
-            <a:avLst/>
-          </a:prstGeom>
-        </p:spPr>
-        <p:txBody>
-          <a:bodyPr wrap="none">
-            <a:spAutoFit/>
-          </a:bodyPr>
-          <a:lstStyle/>
-          <a:p>
-            <a:r>
-              <a:rPr lang="en-US" spc="-5" dirty="0">
-                <a:solidFill>
-                  <a:srgbClr val="00B0F0"/>
-                </a:solidFill>
-              </a:rPr>
-              <a:t>Brian W. Kernighan</a:t>
-            </a:r>
-            <a:endParaRPr lang="en-US" dirty="0">
-              <a:solidFill>
-                <a:srgbClr val="00B0F0"/>
-              </a:solidFill>
-            </a:endParaRPr>
-          </a:p>
-        </p:txBody>
-      </p:sp>
-    </p:spTree>
-    <p:extLst>
-      <p:ext uri="{BB962C8B-B14F-4D97-AF65-F5344CB8AC3E}">
-        <p14:creationId xmlns:p14="http://schemas.microsoft.com/office/powerpoint/2010/main" val="2124089348"/>
-      </p:ext>
-    </p:extLst>
-  </p:cSld>
-  <p:clrMapOvr>
-    <a:masterClrMapping/>
-  </p:clrMapOvr>
-  <p:timing>
-    <p:tnLst>
-      <p:par>
-        <p:cTn id="1" dur="indefinite" restart="never" nodeType="tmRoot"/>
-      </p:par>
-    </p:tnLst>
-  </p:timing>
-</p:sld>
-</file>
-
-<file path=ppt/slides/slide30.xml><?xml version="1.0" encoding="utf-8"?>
+<file path=ppt/slides/slide31.xml><?xml version="1.0" encoding="utf-8"?>
 <p:sld xmlns:a="http://schemas.openxmlformats.org/drawingml/2006/main" xmlns:r="http://schemas.openxmlformats.org/officeDocument/2006/relationships" xmlns:p="http://schemas.openxmlformats.org/presentationml/2006/main">
   <p:cSld>
     <p:spTree>

</xml_diff>

<commit_message>
Add practice to chapter 4 slide
</commit_message>
<xml_diff>
--- a/slides/04 - Chapter 4 - Comments.pptx
+++ b/slides/04 - Chapter 4 - Comments.pptx
@@ -238,7 +238,7 @@
           <a:p>
             <a:fld id="{FA3BAC58-2994-4520-AF2C-D43020CE8323}" type="datetimeFigureOut">
               <a:rPr lang="en-US" smtClean="0"/>
-              <a:t>1/11/2021</a:t>
+              <a:t>1/13/2021</a:t>
             </a:fld>
             <a:endParaRPr lang="en-US"/>
           </a:p>
@@ -3169,15 +3169,6 @@
               </a:rPr>
               <a:t>https://github.com/google/dagger/releases</a:t>
             </a:r>
-            <a:endParaRPr lang="en-US" sz="1200" kern="1200" baseline="0" dirty="0" smtClean="0">
-              <a:solidFill>
-                <a:schemeClr val="tx1"/>
-              </a:solidFill>
-              <a:effectLst/>
-              <a:latin typeface="+mn-lt"/>
-              <a:ea typeface="+mn-ea"/>
-              <a:cs typeface="+mn-cs"/>
-            </a:endParaRPr>
           </a:p>
           <a:p>
             <a:pPr marL="0" indent="0" rtl="0" fontAlgn="ctr">
@@ -3278,86 +3269,6 @@
             <a:pPr marL="0" indent="0" rtl="0" fontAlgn="ctr">
               <a:buNone/>
             </a:pPr>
-            <a:r>
-              <a:rPr lang="en-US" sz="1200" kern="1200" dirty="0" smtClean="0">
-                <a:solidFill>
-                  <a:schemeClr val="tx1"/>
-                </a:solidFill>
-                <a:effectLst/>
-                <a:latin typeface="+mn-lt"/>
-                <a:ea typeface="+mn-ea"/>
-                <a:cs typeface="+mn-cs"/>
-              </a:rPr>
-              <a:t>Use learning</a:t>
-            </a:r>
-            <a:r>
-              <a:rPr lang="en-US" sz="1200" kern="1200" baseline="0" dirty="0" smtClean="0">
-                <a:solidFill>
-                  <a:schemeClr val="tx1"/>
-                </a:solidFill>
-                <a:effectLst/>
-                <a:latin typeface="+mn-lt"/>
-                <a:ea typeface="+mn-ea"/>
-                <a:cs typeface="+mn-cs"/>
-              </a:rPr>
-              <a:t> curve theory to:</a:t>
-            </a:r>
-          </a:p>
-          <a:p>
-            <a:pPr marL="171450" indent="-171450" rtl="0" fontAlgn="ctr">
-              <a:buFontTx/>
-              <a:buChar char="-"/>
-            </a:pPr>
-            <a:r>
-              <a:rPr lang="en-US" sz="1200" kern="1200" baseline="0" dirty="0" smtClean="0">
-                <a:solidFill>
-                  <a:schemeClr val="tx1"/>
-                </a:solidFill>
-                <a:effectLst/>
-                <a:latin typeface="+mn-lt"/>
-                <a:ea typeface="+mn-ea"/>
-                <a:cs typeface="+mn-cs"/>
-              </a:rPr>
-              <a:t>Choose between tools to work with.</a:t>
-            </a:r>
-          </a:p>
-          <a:p>
-            <a:pPr marL="171450" indent="-171450" rtl="0" fontAlgn="ctr">
-              <a:buFontTx/>
-              <a:buChar char="-"/>
-            </a:pPr>
-            <a:r>
-              <a:rPr lang="en-US" sz="1200" kern="1200" baseline="0" dirty="0" smtClean="0">
-                <a:solidFill>
-                  <a:schemeClr val="tx1"/>
-                </a:solidFill>
-                <a:effectLst/>
-                <a:latin typeface="+mn-lt"/>
-                <a:ea typeface="+mn-ea"/>
-                <a:cs typeface="+mn-cs"/>
-              </a:rPr>
-              <a:t>Estimate your work on R&amp;D tasks</a:t>
-            </a:r>
-          </a:p>
-          <a:p>
-            <a:pPr marL="171450" indent="-171450" rtl="0" fontAlgn="ctr">
-              <a:buFontTx/>
-              <a:buChar char="-"/>
-            </a:pPr>
-            <a:endParaRPr lang="en-US" sz="1200" kern="1200" baseline="0" dirty="0" smtClean="0">
-              <a:solidFill>
-                <a:schemeClr val="tx1"/>
-              </a:solidFill>
-              <a:effectLst/>
-              <a:latin typeface="+mn-lt"/>
-              <a:ea typeface="+mn-ea"/>
-              <a:cs typeface="+mn-cs"/>
-            </a:endParaRPr>
-          </a:p>
-          <a:p>
-            <a:pPr marL="0" indent="0" rtl="0" fontAlgn="ctr">
-              <a:buNone/>
-            </a:pPr>
             <a:endParaRPr lang="x-none" sz="1200" kern="1200" dirty="0" smtClean="0">
               <a:solidFill>
                 <a:schemeClr val="tx1"/>
@@ -3396,7 +3307,7 @@
     </p:spTree>
     <p:extLst>
       <p:ext uri="{BB962C8B-B14F-4D97-AF65-F5344CB8AC3E}">
-        <p14:creationId xmlns:p14="http://schemas.microsoft.com/office/powerpoint/2010/main" val="3162544237"/>
+        <p14:creationId xmlns:p14="http://schemas.microsoft.com/office/powerpoint/2010/main" val="696762640"/>
       </p:ext>
     </p:extLst>
   </p:cSld>
@@ -4258,7 +4169,7 @@
           <a:p>
             <a:fld id="{1D8BD707-D9CF-40AE-B4C6-C98DA3205C09}" type="datetimeFigureOut">
               <a:rPr lang="en-US"/>
-              <a:t>1/11/2021</a:t>
+              <a:t>1/13/2021</a:t>
             </a:fld>
             <a:endParaRPr lang="en-US"/>
           </a:p>
@@ -4433,7 +4344,7 @@
           <a:p>
             <a:fld id="{1D8BD707-D9CF-40AE-B4C6-C98DA3205C09}" type="datetimeFigureOut">
               <a:rPr lang="en-US"/>
-              <a:t>1/11/2021</a:t>
+              <a:t>1/13/2021</a:t>
             </a:fld>
             <a:endParaRPr lang="en-US"/>
           </a:p>
@@ -4647,7 +4558,7 @@
           <a:p>
             <a:fld id="{1D8BD707-D9CF-40AE-B4C6-C98DA3205C09}" type="datetimeFigureOut">
               <a:rPr lang="en-US"/>
-              <a:t>1/11/2021</a:t>
+              <a:t>1/13/2021</a:t>
             </a:fld>
             <a:endParaRPr lang="en-US"/>
           </a:p>
@@ -4795,7 +4706,7 @@
           <a:p>
             <a:fld id="{1D8BD707-D9CF-40AE-B4C6-C98DA3205C09}" type="datetimeFigureOut">
               <a:rPr lang="en-US"/>
-              <a:t>1/11/2021</a:t>
+              <a:t>1/13/2021</a:t>
             </a:fld>
             <a:endParaRPr lang="en-US"/>
           </a:p>
@@ -4914,7 +4825,7 @@
           <a:p>
             <a:fld id="{1D8BD707-D9CF-40AE-B4C6-C98DA3205C09}" type="datetimeFigureOut">
               <a:rPr lang="en-US"/>
-              <a:t>1/11/2021</a:t>
+              <a:t>1/13/2021</a:t>
             </a:fld>
             <a:endParaRPr lang="en-US"/>
           </a:p>
@@ -5216,7 +5127,7 @@
           <a:p>
             <a:fld id="{1D8BD707-D9CF-40AE-B4C6-C98DA3205C09}" type="datetimeFigureOut">
               <a:rPr lang="en-US"/>
-              <a:t>1/11/2021</a:t>
+              <a:t>1/13/2021</a:t>
             </a:fld>
             <a:endParaRPr lang="en-US"/>
           </a:p>
@@ -9306,8 +9217,8 @@
         </p:nvSpPr>
         <p:spPr>
           <a:xfrm>
-            <a:off x="-1066800" y="1143000"/>
-            <a:ext cx="13027405" cy="615553"/>
+            <a:off x="228600" y="1143476"/>
+            <a:ext cx="11811000" cy="615553"/>
           </a:xfrm>
           <a:prstGeom prst="rect">
             <a:avLst/>
@@ -9330,11 +9241,11 @@
                   <a:srgbClr val="00B0F0"/>
                 </a:solidFill>
               </a:rPr>
-              <a:t>Vocabulary</a:t>
+              <a:t>Practice</a:t>
             </a:r>
             <a:r>
               <a:rPr lang="en-US" spc="-5" dirty="0" smtClean="0"/>
-              <a:t>: Learning curve</a:t>
+              <a:t>: Code smell</a:t>
             </a:r>
             <a:endParaRPr spc="-5" dirty="0">
               <a:latin typeface="Century Gothic"/>
@@ -9351,8 +9262,8 @@
         </p:nvSpPr>
         <p:spPr>
           <a:xfrm>
-            <a:off x="892986" y="2133600"/>
-            <a:ext cx="10765614" cy="1477328"/>
+            <a:off x="892986" y="2367695"/>
+            <a:ext cx="10534219" cy="3939540"/>
           </a:xfrm>
           <a:prstGeom prst="rect">
             <a:avLst/>
@@ -9380,17 +9291,17 @@
                 <a:latin typeface="Century Gothic"/>
                 <a:cs typeface="Century Gothic"/>
               </a:rPr>
-              <a:t>Relationship between </a:t>
-            </a:r>
-            <a:r>
-              <a:rPr lang="en-US" sz="3200" dirty="0" smtClean="0">
-                <a:solidFill>
-                  <a:srgbClr val="FFFF00"/>
+              <a:t>Find a project on </a:t>
+            </a:r>
+            <a:r>
+              <a:rPr lang="en-US" sz="3200" dirty="0" err="1" smtClean="0">
+                <a:solidFill>
+                  <a:srgbClr val="FFFFFF"/>
                 </a:solidFill>
                 <a:latin typeface="Century Gothic"/>
                 <a:cs typeface="Century Gothic"/>
               </a:rPr>
-              <a:t>Proficiency</a:t>
+              <a:t>Github</a:t>
             </a:r>
             <a:r>
               <a:rPr lang="en-US" sz="3200" dirty="0" smtClean="0">
@@ -9400,177 +9311,159 @@
                 <a:latin typeface="Century Gothic"/>
                 <a:cs typeface="Century Gothic"/>
               </a:rPr>
-              <a:t> and </a:t>
-            </a:r>
-            <a:r>
-              <a:rPr lang="en-US" sz="3200" dirty="0" smtClean="0">
-                <a:solidFill>
-                  <a:srgbClr val="FFFF00"/>
-                </a:solidFill>
-                <a:latin typeface="Century Gothic"/>
-                <a:cs typeface="Century Gothic"/>
-              </a:rPr>
-              <a:t>Amount of time </a:t>
-            </a:r>
-            <a:r>
-              <a:rPr lang="en-US" sz="3200" dirty="0" smtClean="0">
-                <a:solidFill>
-                  <a:srgbClr val="FFFFFF"/>
-                </a:solidFill>
-                <a:latin typeface="Century Gothic"/>
-                <a:cs typeface="Century Gothic"/>
-              </a:rPr>
-              <a:t>you spend to learn something</a:t>
-            </a:r>
-            <a:br>
-              <a:rPr lang="en-US" sz="3200" dirty="0" smtClean="0">
-                <a:solidFill>
-                  <a:srgbClr val="FFFFFF"/>
-                </a:solidFill>
-                <a:latin typeface="Century Gothic"/>
-                <a:cs typeface="Century Gothic"/>
-              </a:rPr>
-            </a:br>
-            <a:r>
-              <a:rPr lang="en-US" sz="3200" dirty="0" smtClean="0">
-                <a:solidFill>
-                  <a:srgbClr val="FFFFFF"/>
-                </a:solidFill>
-                <a:latin typeface="Century Gothic"/>
-                <a:cs typeface="Century Gothic"/>
-              </a:rPr>
-              <a:t>To do a task as Done.</a:t>
-            </a:r>
-            <a:endParaRPr lang="en-US" sz="3200" dirty="0" smtClean="0">
+              <a:t> and review it’s code</a:t>
+            </a:r>
+          </a:p>
+          <a:p>
+            <a:pPr marL="469900" indent="-457200">
+              <a:lnSpc>
+                <a:spcPct val="100000"/>
+              </a:lnSpc>
+              <a:buFontTx/>
+              <a:buChar char="-"/>
+              <a:tabLst>
+                <a:tab pos="241300" algn="l"/>
+              </a:tabLst>
+            </a:pPr>
+            <a:endParaRPr lang="en-US" sz="3200" dirty="0">
               <a:solidFill>
-                <a:schemeClr val="bg1"/>
+                <a:srgbClr val="FFFFFF"/>
               </a:solidFill>
               <a:latin typeface="Century Gothic"/>
               <a:cs typeface="Century Gothic"/>
             </a:endParaRPr>
           </a:p>
-        </p:txBody>
-      </p:sp>
-      <p:pic>
-        <p:nvPicPr>
-          <p:cNvPr id="1026" name="Picture 2" descr="https://en.wikipedia.org/api/rest_v1/page/graph/png/Learning_curve/0/8ecbe54983fb93cd5cacd2eaf19e9f5e1bb6f245.png"/>
-          <p:cNvPicPr>
-            <a:picLocks noChangeAspect="1" noChangeArrowheads="1"/>
-          </p:cNvPicPr>
-          <p:nvPr/>
-        </p:nvPicPr>
-        <p:blipFill>
-          <a:blip r:embed="rId3">
-            <a:extLst>
-              <a:ext uri="{28A0092B-C50C-407E-A947-70E740481C1C}">
-                <a14:useLocalDpi xmlns:a14="http://schemas.microsoft.com/office/drawing/2010/main" val="0"/>
-              </a:ext>
-            </a:extLst>
-          </a:blip>
-          <a:srcRect/>
-          <a:stretch>
-            <a:fillRect/>
-          </a:stretch>
-        </p:blipFill>
-        <p:spPr bwMode="auto">
-          <a:xfrm>
-            <a:off x="1752600" y="4034444"/>
-            <a:ext cx="3453938" cy="2517040"/>
-          </a:xfrm>
-          <a:prstGeom prst="roundRect">
-            <a:avLst>
-              <a:gd name="adj" fmla="val 4167"/>
-            </a:avLst>
-          </a:prstGeom>
-          <a:solidFill>
-            <a:srgbClr val="FFFFFF"/>
-          </a:solidFill>
-          <a:ln w="76200" cap="sq">
-            <a:solidFill>
-              <a:srgbClr val="EAEAEA"/>
-            </a:solidFill>
-            <a:miter lim="800000"/>
-          </a:ln>
-          <a:effectLst>
-            <a:reflection blurRad="12700" stA="33000" endPos="28000" dist="5000" dir="5400000" sy="-100000" algn="bl" rotWithShape="0"/>
-          </a:effectLst>
-          <a:scene3d>
-            <a:camera prst="orthographicFront"/>
-            <a:lightRig rig="threePt" dir="t">
-              <a:rot lat="0" lon="0" rev="2700000"/>
-            </a:lightRig>
-          </a:scene3d>
-          <a:sp3d contourW="6350">
-            <a:bevelT h="38100"/>
-            <a:contourClr>
-              <a:srgbClr val="C0C0C0"/>
-            </a:contourClr>
-          </a:sp3d>
-          <a:extLst/>
-        </p:spPr>
-      </p:pic>
-      <p:pic>
-        <p:nvPicPr>
-          <p:cNvPr id="1028" name="Picture 4" descr="https://en.wikipedia.org/api/rest_v1/page/graph/png/Learning_curve/0/d5319f58b5392f830a0a3406a14a65d110da8784.png"/>
-          <p:cNvPicPr>
-            <a:picLocks noChangeAspect="1" noChangeArrowheads="1"/>
-          </p:cNvPicPr>
-          <p:nvPr/>
-        </p:nvPicPr>
-        <p:blipFill>
-          <a:blip r:embed="rId4">
-            <a:extLst>
-              <a:ext uri="{28A0092B-C50C-407E-A947-70E740481C1C}">
-                <a14:useLocalDpi xmlns:a14="http://schemas.microsoft.com/office/drawing/2010/main" val="0"/>
-              </a:ext>
-            </a:extLst>
-          </a:blip>
-          <a:srcRect/>
-          <a:stretch>
-            <a:fillRect/>
-          </a:stretch>
-        </p:blipFill>
-        <p:spPr bwMode="auto">
-          <a:xfrm>
-            <a:off x="7086601" y="4034444"/>
-            <a:ext cx="3593774" cy="2517040"/>
-          </a:xfrm>
-          <a:prstGeom prst="roundRect">
-            <a:avLst>
-              <a:gd name="adj" fmla="val 4167"/>
-            </a:avLst>
-          </a:prstGeom>
-          <a:solidFill>
-            <a:srgbClr val="FFFFFF"/>
-          </a:solidFill>
-          <a:ln w="76200" cap="sq">
-            <a:solidFill>
-              <a:srgbClr val="EAEAEA"/>
-            </a:solidFill>
-            <a:miter lim="800000"/>
-          </a:ln>
-          <a:effectLst>
-            <a:reflection blurRad="12700" stA="33000" endPos="28000" dist="5000" dir="5400000" sy="-100000" algn="bl" rotWithShape="0"/>
-          </a:effectLst>
-          <a:scene3d>
-            <a:camera prst="orthographicFront"/>
-            <a:lightRig rig="threePt" dir="t">
-              <a:rot lat="0" lon="0" rev="2700000"/>
-            </a:lightRig>
-          </a:scene3d>
-          <a:sp3d contourW="6350">
-            <a:bevelT h="38100"/>
-            <a:contourClr>
-              <a:srgbClr val="C0C0C0"/>
-            </a:contourClr>
-          </a:sp3d>
-          <a:extLst/>
-        </p:spPr>
-      </p:pic>
+          <a:p>
+            <a:pPr marL="12700">
+              <a:lnSpc>
+                <a:spcPct val="100000"/>
+              </a:lnSpc>
+              <a:tabLst>
+                <a:tab pos="241300" algn="l"/>
+              </a:tabLst>
+            </a:pPr>
+            <a:r>
+              <a:rPr lang="en-US" sz="3200" dirty="0" smtClean="0">
+                <a:solidFill>
+                  <a:srgbClr val="FFFF00"/>
+                </a:solidFill>
+                <a:latin typeface="Century Gothic"/>
+                <a:cs typeface="Century Gothic"/>
+              </a:rPr>
+              <a:t>Definition of Done</a:t>
+            </a:r>
+          </a:p>
+          <a:p>
+            <a:pPr marL="469900" indent="-457200">
+              <a:lnSpc>
+                <a:spcPct val="100000"/>
+              </a:lnSpc>
+              <a:buFontTx/>
+              <a:buChar char="-"/>
+              <a:tabLst>
+                <a:tab pos="241300" algn="l"/>
+              </a:tabLst>
+            </a:pPr>
+            <a:r>
+              <a:rPr lang="en-US" sz="3200" dirty="0" smtClean="0">
+                <a:solidFill>
+                  <a:srgbClr val="FFFFFF"/>
+                </a:solidFill>
+                <a:latin typeface="Century Gothic"/>
+                <a:cs typeface="Century Gothic"/>
+              </a:rPr>
+              <a:t>List 5 naming issues</a:t>
+            </a:r>
+          </a:p>
+          <a:p>
+            <a:pPr marL="469900" indent="-457200">
+              <a:lnSpc>
+                <a:spcPct val="100000"/>
+              </a:lnSpc>
+              <a:buFontTx/>
+              <a:buChar char="-"/>
+              <a:tabLst>
+                <a:tab pos="241300" algn="l"/>
+              </a:tabLst>
+            </a:pPr>
+            <a:r>
+              <a:rPr lang="en-US" sz="3200" dirty="0" smtClean="0">
+                <a:solidFill>
+                  <a:srgbClr val="FFFFFF"/>
+                </a:solidFill>
+                <a:latin typeface="Century Gothic"/>
+                <a:cs typeface="Century Gothic"/>
+              </a:rPr>
+              <a:t>List 3 function issues</a:t>
+            </a:r>
+          </a:p>
+          <a:p>
+            <a:pPr marL="469900" indent="-457200">
+              <a:lnSpc>
+                <a:spcPct val="100000"/>
+              </a:lnSpc>
+              <a:buFontTx/>
+              <a:buChar char="-"/>
+              <a:tabLst>
+                <a:tab pos="241300" algn="l"/>
+              </a:tabLst>
+            </a:pPr>
+            <a:r>
+              <a:rPr lang="en-US" sz="3200" dirty="0" smtClean="0">
+                <a:solidFill>
+                  <a:srgbClr val="FFFFFF"/>
+                </a:solidFill>
+                <a:latin typeface="Century Gothic"/>
+                <a:cs typeface="Century Gothic"/>
+              </a:rPr>
+              <a:t>List 3 comment issues</a:t>
+            </a:r>
+          </a:p>
+          <a:p>
+            <a:pPr marL="469900" indent="-457200">
+              <a:lnSpc>
+                <a:spcPct val="100000"/>
+              </a:lnSpc>
+              <a:buFontTx/>
+              <a:buChar char="-"/>
+              <a:tabLst>
+                <a:tab pos="241300" algn="l"/>
+              </a:tabLst>
+            </a:pPr>
+            <a:endParaRPr lang="en-US" sz="3200" dirty="0">
+              <a:solidFill>
+                <a:srgbClr val="FFFFFF"/>
+              </a:solidFill>
+              <a:latin typeface="Century Gothic"/>
+              <a:cs typeface="Century Gothic"/>
+            </a:endParaRPr>
+          </a:p>
+          <a:p>
+            <a:pPr marL="12700">
+              <a:lnSpc>
+                <a:spcPct val="100000"/>
+              </a:lnSpc>
+              <a:tabLst>
+                <a:tab pos="241300" algn="l"/>
+              </a:tabLst>
+            </a:pPr>
+            <a:r>
+              <a:rPr lang="en-US" sz="3200" dirty="0" smtClean="0">
+                <a:solidFill>
+                  <a:srgbClr val="FFFFFF"/>
+                </a:solidFill>
+                <a:latin typeface="Century Gothic"/>
+                <a:cs typeface="Century Gothic"/>
+              </a:rPr>
+              <a:t>Create a pull request from your edit suggestion</a:t>
+            </a:r>
+          </a:p>
+        </p:txBody>
+      </p:sp>
     </p:spTree>
     <p:extLst>
       <p:ext uri="{BB962C8B-B14F-4D97-AF65-F5344CB8AC3E}">
-        <p14:creationId xmlns:p14="http://schemas.microsoft.com/office/powerpoint/2010/main" val="3821158735"/>
+        <p14:creationId xmlns:p14="http://schemas.microsoft.com/office/powerpoint/2010/main" val="62474817"/>
       </p:ext>
     </p:extLst>
   </p:cSld>

</xml_diff>